<commit_message>
Added PDF versions of presentations
</commit_message>
<xml_diff>
--- a/leasson-5/JavaScript-lecture-5.pptx
+++ b/leasson-5/JavaScript-lecture-5.pptx
@@ -8278,13 +8278,7 @@
               <a:rPr lang="uk-UA" sz="2000" dirty="0" smtClean="0">
                 <a:effectLst/>
               </a:rPr>
-              <a:t>Створенн</a:t>
-            </a:r>
-            <a:r>
-              <a:rPr lang="uk-UA" sz="2000" dirty="0" smtClean="0">
-                <a:effectLst/>
-              </a:rPr>
-              <a:t>я - </a:t>
+              <a:t>Створення - </a:t>
             </a:r>
             <a:r>
               <a:rPr lang="en-US" sz="2000" b="1" dirty="0">
@@ -8799,9 +8793,6 @@
               </a:rPr>
               <a:t>UTC)</a:t>
             </a:r>
-            <a:endParaRPr lang="en-US" sz="1400" dirty="0">
-              <a:effectLst/>
-            </a:endParaRPr>
           </a:p>
         </p:txBody>
       </p:sp>
@@ -8882,11 +8873,7 @@
           <a:p>
             <a:r>
               <a:rPr lang="uk-UA" dirty="0" smtClean="0"/>
-              <a:t>Створити </a:t>
-            </a:r>
-            <a:r>
-              <a:rPr lang="uk-UA" dirty="0" smtClean="0"/>
-              <a:t>функцію для </a:t>
+              <a:t>Створити функцію для </a:t>
             </a:r>
             <a:r>
               <a:rPr lang="uk-UA" dirty="0" err="1" smtClean="0"/>
@@ -8912,7 +8899,7 @@
             </a:r>
             <a:r>
               <a:rPr lang="en-US" smtClean="0"/>
-              <a:t>e-mail</a:t>
+              <a:t>e-mail </a:t>
             </a:r>
             <a:endParaRPr lang="uk-UA" dirty="0"/>
           </a:p>
@@ -11670,9 +11657,6 @@
               </a:rPr>
               <a:t> пошук</a:t>
             </a:r>
-            <a:endParaRPr lang="uk-UA" sz="2000" dirty="0" smtClean="0">
-              <a:effectLst/>
-            </a:endParaRPr>
           </a:p>
           <a:p>
             <a:pPr lvl="1"/>
@@ -12360,9 +12344,6 @@
               </a:rPr>
               <a:t> – розбиває строку на масив по роздільнику</a:t>
             </a:r>
-            <a:endParaRPr lang="uk-UA" sz="2000" dirty="0" smtClean="0">
-              <a:effectLst/>
-            </a:endParaRPr>
           </a:p>
           <a:p>
             <a:r>

</xml_diff>